<commit_message>
Deploying to gh-pages from @ taroosg/development-with-ai@9e61fec06a76e82f36e26e4cd1e0f121bf3a86f5 🚀
</commit_message>
<xml_diff>
--- a/README.pptx
+++ b/README.pptx
@@ -17,11 +17,9 @@
     <p:sldId id="265" r:id="rId11"/>
     <p:sldId id="266" r:id="rId12"/>
     <p:sldId id="267" r:id="rId13"/>
-    <p:sldId id="268" r:id="rId14"/>
-    <p:sldId id="269" r:id="rId15"/>
   </p:sldIdLst>
   <p:notesMasterIdLst>
-    <p:notesMasterId r:id="rId16"/>
+    <p:notesMasterId r:id="rId14"/>
   </p:notesMasterIdLst>
   <p:sldSz cx="12192000" cy="6858000"/>
   <p:notesSz cx="6858000" cy="12192000"/>
@@ -803,182 +801,6 @@
             <a:fld id="{F7021451-1387-4CA6-816F-3879F97B5CBC}" type="slidenum">
               <a:rPr lang="en-US"/>
               <a:t>12</a:t>
-            </a:fld>
-            <a:endParaRPr lang="en-US"/>
-          </a:p>
-        </p:txBody>
-      </p:sp>
-    </p:spTree>
-    <p:extLst>
-      <p:ext uri="{BB962C8B-B14F-4D97-AF65-F5344CB8AC3E}">
-        <p14:creationId xmlns:p14="http://schemas.microsoft.com/office/powerpoint/2010/main" val="1024086991"/>
-      </p:ext>
-    </p:extLst>
-  </p:cSld>
-  <p:clrMapOvr>
-    <a:masterClrMapping/>
-  </p:clrMapOvr>
-</p:notes>
-</file>
-
-<file path=ppt/notesSlides/notesSlide13.xml><?xml version="1.0" encoding="utf-8"?>
-<p:notes xmlns:a="http://schemas.openxmlformats.org/drawingml/2006/main" xmlns:r="http://schemas.openxmlformats.org/officeDocument/2006/relationships" xmlns:p="http://schemas.openxmlformats.org/presentationml/2006/main">
-  <p:cSld>
-    <p:spTree>
-      <p:nvGrpSpPr>
-        <p:cNvPr id="1" name=""/>
-        <p:cNvGrpSpPr/>
-        <p:nvPr/>
-      </p:nvGrpSpPr>
-      <p:grpSpPr>
-        <a:xfrm>
-          <a:off x="0" y="0"/>
-          <a:ext cx="0" cy="0"/>
-          <a:chOff x="0" y="0"/>
-          <a:chExt cx="0" cy="0"/>
-        </a:xfrm>
-      </p:grpSpPr>
-      <p:sp>
-        <p:nvSpPr>
-          <p:cNvPr id="2" name="Slide Image Placeholder 1"/>
-          <p:cNvSpPr>
-            <a:spLocks noGrp="1" noRot="1" noChangeAspect="1"/>
-          </p:cNvSpPr>
-          <p:nvPr>
-            <p:ph type="sldImg"/>
-          </p:nvPr>
-        </p:nvSpPr>
-        <p:spPr/>
-      </p:sp>
-      <p:sp>
-        <p:nvSpPr>
-          <p:cNvPr id="3" name="Notes Placeholder 2"/>
-          <p:cNvSpPr>
-            <a:spLocks noGrp="1"/>
-          </p:cNvSpPr>
-          <p:nvPr>
-            <p:ph type="body" idx="1"/>
-          </p:nvPr>
-        </p:nvSpPr>
-        <p:spPr/>
-        <p:txBody>
-          <a:bodyPr/>
-          <a:lstStyle/>
-          <a:p>
-            <a:r>
-              <a:rPr lang="en-US" dirty="0"/>
-              <a:t/>
-            </a:r>
-            <a:endParaRPr lang="en-US" dirty="0"/>
-          </a:p>
-        </p:txBody>
-      </p:sp>
-      <p:sp>
-        <p:nvSpPr>
-          <p:cNvPr id="4" name="Slide Number Placeholder 3"/>
-          <p:cNvSpPr>
-            <a:spLocks noGrp="1"/>
-          </p:cNvSpPr>
-          <p:nvPr>
-            <p:ph type="sldNum" sz="quarter" idx="10"/>
-          </p:nvPr>
-        </p:nvSpPr>
-        <p:spPr/>
-        <p:txBody>
-          <a:bodyPr/>
-          <a:lstStyle/>
-          <a:p>
-            <a:fld id="{F7021451-1387-4CA6-816F-3879F97B5CBC}" type="slidenum">
-              <a:rPr lang="en-US"/>
-              <a:t>13</a:t>
-            </a:fld>
-            <a:endParaRPr lang="en-US"/>
-          </a:p>
-        </p:txBody>
-      </p:sp>
-    </p:spTree>
-    <p:extLst>
-      <p:ext uri="{BB962C8B-B14F-4D97-AF65-F5344CB8AC3E}">
-        <p14:creationId xmlns:p14="http://schemas.microsoft.com/office/powerpoint/2010/main" val="1024086991"/>
-      </p:ext>
-    </p:extLst>
-  </p:cSld>
-  <p:clrMapOvr>
-    <a:masterClrMapping/>
-  </p:clrMapOvr>
-</p:notes>
-</file>
-
-<file path=ppt/notesSlides/notesSlide14.xml><?xml version="1.0" encoding="utf-8"?>
-<p:notes xmlns:a="http://schemas.openxmlformats.org/drawingml/2006/main" xmlns:r="http://schemas.openxmlformats.org/officeDocument/2006/relationships" xmlns:p="http://schemas.openxmlformats.org/presentationml/2006/main">
-  <p:cSld>
-    <p:spTree>
-      <p:nvGrpSpPr>
-        <p:cNvPr id="1" name=""/>
-        <p:cNvGrpSpPr/>
-        <p:nvPr/>
-      </p:nvGrpSpPr>
-      <p:grpSpPr>
-        <a:xfrm>
-          <a:off x="0" y="0"/>
-          <a:ext cx="0" cy="0"/>
-          <a:chOff x="0" y="0"/>
-          <a:chExt cx="0" cy="0"/>
-        </a:xfrm>
-      </p:grpSpPr>
-      <p:sp>
-        <p:nvSpPr>
-          <p:cNvPr id="2" name="Slide Image Placeholder 1"/>
-          <p:cNvSpPr>
-            <a:spLocks noGrp="1" noRot="1" noChangeAspect="1"/>
-          </p:cNvSpPr>
-          <p:nvPr>
-            <p:ph type="sldImg"/>
-          </p:nvPr>
-        </p:nvSpPr>
-        <p:spPr/>
-      </p:sp>
-      <p:sp>
-        <p:nvSpPr>
-          <p:cNvPr id="3" name="Notes Placeholder 2"/>
-          <p:cNvSpPr>
-            <a:spLocks noGrp="1"/>
-          </p:cNvSpPr>
-          <p:nvPr>
-            <p:ph type="body" idx="1"/>
-          </p:nvPr>
-        </p:nvSpPr>
-        <p:spPr/>
-        <p:txBody>
-          <a:bodyPr/>
-          <a:lstStyle/>
-          <a:p>
-            <a:r>
-              <a:rPr lang="en-US" dirty="0"/>
-              <a:t/>
-            </a:r>
-            <a:endParaRPr lang="en-US" dirty="0"/>
-          </a:p>
-        </p:txBody>
-      </p:sp>
-      <p:sp>
-        <p:nvSpPr>
-          <p:cNvPr id="4" name="Slide Number Placeholder 3"/>
-          <p:cNvSpPr>
-            <a:spLocks noGrp="1"/>
-          </p:cNvSpPr>
-          <p:nvPr>
-            <p:ph type="sldNum" sz="quarter" idx="10"/>
-          </p:nvPr>
-        </p:nvSpPr>
-        <p:spPr/>
-        <p:txBody>
-          <a:bodyPr/>
-          <a:lstStyle/>
-          <a:p>
-            <a:fld id="{F7021451-1387-4CA6-816F-3879F97B5CBC}" type="slidenum">
-              <a:rPr lang="en-US"/>
-              <a:t>14</a:t>
             </a:fld>
             <a:endParaRPr lang="en-US"/>
           </a:p>
@@ -2128,84 +1950,6 @@
 <file path=ppt/slides/slide12.xml><?xml version="1.0" encoding="utf-8"?>
 <p:sld xmlns:a="http://schemas.openxmlformats.org/drawingml/2006/main" xmlns:r="http://schemas.openxmlformats.org/officeDocument/2006/relationships" xmlns:p="http://schemas.openxmlformats.org/presentationml/2006/main">
   <p:cSld name="Slide 12">
-    <p:bg>
-      <p:bgPr>
-        <a:blipFill dpi="0" rotWithShape="1">
-          <a:blip r:embed="rId1">
-            <a:lum/>
-          </a:blip>
-          <a:srcRect/>
-          <a:stretch>
-            <a:fillRect/>
-          </a:stretch>
-        </a:blipFill>
-        <a:effectLst/>
-      </p:bgPr>
-    </p:bg>
-    <p:spTree>
-      <p:nvGrpSpPr>
-        <p:cNvPr id="1" name=""/>
-        <p:cNvGrpSpPr/>
-        <p:nvPr/>
-      </p:nvGrpSpPr>
-      <p:grpSpPr>
-        <a:xfrm>
-          <a:off x="0" y="0"/>
-          <a:ext cx="0" cy="0"/>
-          <a:chOff x="0" y="0"/>
-          <a:chExt cx="0" cy="0"/>
-        </a:xfrm>
-      </p:grpSpPr>
-    </p:spTree>
-  </p:cSld>
-  <p:clrMapOvr>
-    <a:masterClrMapping/>
-  </p:clrMapOvr>
-</p:sld>
-</file>
-
-<file path=ppt/slides/slide13.xml><?xml version="1.0" encoding="utf-8"?>
-<p:sld xmlns:a="http://schemas.openxmlformats.org/drawingml/2006/main" xmlns:r="http://schemas.openxmlformats.org/officeDocument/2006/relationships" xmlns:p="http://schemas.openxmlformats.org/presentationml/2006/main">
-  <p:cSld name="Slide 13">
-    <p:bg>
-      <p:bgPr>
-        <a:blipFill dpi="0" rotWithShape="1">
-          <a:blip r:embed="rId1">
-            <a:lum/>
-          </a:blip>
-          <a:srcRect/>
-          <a:stretch>
-            <a:fillRect/>
-          </a:stretch>
-        </a:blipFill>
-        <a:effectLst/>
-      </p:bgPr>
-    </p:bg>
-    <p:spTree>
-      <p:nvGrpSpPr>
-        <p:cNvPr id="1" name=""/>
-        <p:cNvGrpSpPr/>
-        <p:nvPr/>
-      </p:nvGrpSpPr>
-      <p:grpSpPr>
-        <a:xfrm>
-          <a:off x="0" y="0"/>
-          <a:ext cx="0" cy="0"/>
-          <a:chOff x="0" y="0"/>
-          <a:chExt cx="0" cy="0"/>
-        </a:xfrm>
-      </p:grpSpPr>
-    </p:spTree>
-  </p:cSld>
-  <p:clrMapOvr>
-    <a:masterClrMapping/>
-  </p:clrMapOvr>
-</p:sld>
-</file>
-
-<file path=ppt/slides/slide14.xml><?xml version="1.0" encoding="utf-8"?>
-<p:sld xmlns:a="http://schemas.openxmlformats.org/drawingml/2006/main" xmlns:r="http://schemas.openxmlformats.org/officeDocument/2006/relationships" xmlns:p="http://schemas.openxmlformats.org/presentationml/2006/main">
-  <p:cSld name="Slide 14">
     <p:bg>
       <p:bgPr>
         <a:blipFill dpi="0" rotWithShape="1">

</xml_diff>